<commit_message>
finished first draft of Chapter 17
</commit_message>
<xml_diff>
--- a/Images/Paris.pptx
+++ b/Images/Paris.pptx
@@ -104,6 +104,11 @@
       </a:defRPr>
     </a:lvl9pPr>
   </p:defaultTextStyle>
+  <p:extLst>
+    <p:ext uri="{EFAFB233-063F-42B5-8137-9DF3F51BA10A}">
+      <p15:sldGuideLst xmlns:p15="http://schemas.microsoft.com/office/powerpoint/2012/main"/>
+    </p:ext>
+  </p:extLst>
 </p:presentation>
 </file>
 
@@ -254,7 +259,7 @@
           <a:p>
             <a:fld id="{C16D601D-9DD3-4057-9EC2-E96125B50B5F}" type="datetimeFigureOut">
               <a:rPr lang="en-US" smtClean="0"/>
-              <a:t>2/4/2020</a:t>
+              <a:t>2/14/2020</a:t>
             </a:fld>
             <a:endParaRPr lang="en-US"/>
           </a:p>
@@ -452,7 +457,7 @@
           <a:p>
             <a:fld id="{C16D601D-9DD3-4057-9EC2-E96125B50B5F}" type="datetimeFigureOut">
               <a:rPr lang="en-US" smtClean="0"/>
-              <a:t>2/4/2020</a:t>
+              <a:t>2/14/2020</a:t>
             </a:fld>
             <a:endParaRPr lang="en-US"/>
           </a:p>
@@ -660,7 +665,7 @@
           <a:p>
             <a:fld id="{C16D601D-9DD3-4057-9EC2-E96125B50B5F}" type="datetimeFigureOut">
               <a:rPr lang="en-US" smtClean="0"/>
-              <a:t>2/4/2020</a:t>
+              <a:t>2/14/2020</a:t>
             </a:fld>
             <a:endParaRPr lang="en-US"/>
           </a:p>
@@ -858,7 +863,7 @@
           <a:p>
             <a:fld id="{C16D601D-9DD3-4057-9EC2-E96125B50B5F}" type="datetimeFigureOut">
               <a:rPr lang="en-US" smtClean="0"/>
-              <a:t>2/4/2020</a:t>
+              <a:t>2/14/2020</a:t>
             </a:fld>
             <a:endParaRPr lang="en-US"/>
           </a:p>
@@ -1133,7 +1138,7 @@
           <a:p>
             <a:fld id="{C16D601D-9DD3-4057-9EC2-E96125B50B5F}" type="datetimeFigureOut">
               <a:rPr lang="en-US" smtClean="0"/>
-              <a:t>2/4/2020</a:t>
+              <a:t>2/14/2020</a:t>
             </a:fld>
             <a:endParaRPr lang="en-US"/>
           </a:p>
@@ -1398,7 +1403,7 @@
           <a:p>
             <a:fld id="{C16D601D-9DD3-4057-9EC2-E96125B50B5F}" type="datetimeFigureOut">
               <a:rPr lang="en-US" smtClean="0"/>
-              <a:t>2/4/2020</a:t>
+              <a:t>2/14/2020</a:t>
             </a:fld>
             <a:endParaRPr lang="en-US"/>
           </a:p>
@@ -1810,7 +1815,7 @@
           <a:p>
             <a:fld id="{C16D601D-9DD3-4057-9EC2-E96125B50B5F}" type="datetimeFigureOut">
               <a:rPr lang="en-US" smtClean="0"/>
-              <a:t>2/4/2020</a:t>
+              <a:t>2/14/2020</a:t>
             </a:fld>
             <a:endParaRPr lang="en-US"/>
           </a:p>
@@ -1951,7 +1956,7 @@
           <a:p>
             <a:fld id="{C16D601D-9DD3-4057-9EC2-E96125B50B5F}" type="datetimeFigureOut">
               <a:rPr lang="en-US" smtClean="0"/>
-              <a:t>2/4/2020</a:t>
+              <a:t>2/14/2020</a:t>
             </a:fld>
             <a:endParaRPr lang="en-US"/>
           </a:p>
@@ -2064,7 +2069,7 @@
           <a:p>
             <a:fld id="{C16D601D-9DD3-4057-9EC2-E96125B50B5F}" type="datetimeFigureOut">
               <a:rPr lang="en-US" smtClean="0"/>
-              <a:t>2/4/2020</a:t>
+              <a:t>2/14/2020</a:t>
             </a:fld>
             <a:endParaRPr lang="en-US"/>
           </a:p>
@@ -2375,7 +2380,7 @@
           <a:p>
             <a:fld id="{C16D601D-9DD3-4057-9EC2-E96125B50B5F}" type="datetimeFigureOut">
               <a:rPr lang="en-US" smtClean="0"/>
-              <a:t>2/4/2020</a:t>
+              <a:t>2/14/2020</a:t>
             </a:fld>
             <a:endParaRPr lang="en-US"/>
           </a:p>
@@ -2663,7 +2668,7 @@
           <a:p>
             <a:fld id="{C16D601D-9DD3-4057-9EC2-E96125B50B5F}" type="datetimeFigureOut">
               <a:rPr lang="en-US" smtClean="0"/>
-              <a:t>2/4/2020</a:t>
+              <a:t>2/14/2020</a:t>
             </a:fld>
             <a:endParaRPr lang="en-US"/>
           </a:p>
@@ -2904,7 +2909,7 @@
           <a:p>
             <a:fld id="{C16D601D-9DD3-4057-9EC2-E96125B50B5F}" type="datetimeFigureOut">
               <a:rPr lang="en-US" smtClean="0"/>
-              <a:t>2/4/2020</a:t>
+              <a:t>2/14/2020</a:t>
             </a:fld>
             <a:endParaRPr lang="en-US"/>
           </a:p>
@@ -3321,12 +3326,431 @@
           <a:chExt cx="0" cy="0"/>
         </a:xfrm>
       </p:grpSpPr>
+      <p:cxnSp>
+        <p:nvCxnSpPr>
+          <p:cNvPr id="59" name="Straight Connector 58">
+            <a:extLst>
+              <a:ext uri="{FF2B5EF4-FFF2-40B4-BE49-F238E27FC236}">
+                <a16:creationId xmlns:a16="http://schemas.microsoft.com/office/drawing/2014/main" id="{472E1CBC-12EA-4FC9-BE6B-FF4FD1401B2C}"/>
+              </a:ext>
+            </a:extLst>
+          </p:cNvPr>
+          <p:cNvCxnSpPr>
+            <a:cxnSpLocks/>
+          </p:cNvCxnSpPr>
+          <p:nvPr/>
+        </p:nvCxnSpPr>
+        <p:spPr>
+          <a:xfrm flipH="1">
+            <a:off x="4529075" y="2119529"/>
+            <a:ext cx="241728" cy="255250"/>
+          </a:xfrm>
+          <a:prstGeom prst="line">
+            <a:avLst/>
+          </a:prstGeom>
+          <a:ln w="38100">
+            <a:solidFill>
+              <a:schemeClr val="accent2"/>
+            </a:solidFill>
+            <a:prstDash val="solid"/>
+          </a:ln>
+        </p:spPr>
+        <p:style>
+          <a:lnRef idx="1">
+            <a:schemeClr val="accent1"/>
+          </a:lnRef>
+          <a:fillRef idx="0">
+            <a:schemeClr val="accent1"/>
+          </a:fillRef>
+          <a:effectRef idx="0">
+            <a:schemeClr val="accent1"/>
+          </a:effectRef>
+          <a:fontRef idx="minor">
+            <a:schemeClr val="tx1"/>
+          </a:fontRef>
+        </p:style>
+      </p:cxnSp>
+      <p:sp>
+        <p:nvSpPr>
+          <p:cNvPr id="2" name="Arc 1">
+            <a:extLst>
+              <a:ext uri="{FF2B5EF4-FFF2-40B4-BE49-F238E27FC236}">
+                <a16:creationId xmlns:a16="http://schemas.microsoft.com/office/drawing/2014/main" id="{A3F672F6-AA38-4CB8-93AA-B88AE21955C2}"/>
+              </a:ext>
+            </a:extLst>
+          </p:cNvPr>
+          <p:cNvSpPr/>
+          <p:nvPr/>
+        </p:nvSpPr>
+        <p:spPr>
+          <a:xfrm>
+            <a:off x="4775200" y="1365956"/>
+            <a:ext cx="1512711" cy="1603022"/>
+          </a:xfrm>
+          <a:prstGeom prst="arc">
+            <a:avLst>
+              <a:gd name="adj1" fmla="val 11017979"/>
+              <a:gd name="adj2" fmla="val 0"/>
+            </a:avLst>
+          </a:prstGeom>
+          <a:ln w="38100">
+            <a:solidFill>
+              <a:schemeClr val="accent2"/>
+            </a:solidFill>
+          </a:ln>
+        </p:spPr>
+        <p:style>
+          <a:lnRef idx="1">
+            <a:schemeClr val="accent1"/>
+          </a:lnRef>
+          <a:fillRef idx="0">
+            <a:schemeClr val="accent1"/>
+          </a:fillRef>
+          <a:effectRef idx="0">
+            <a:schemeClr val="accent1"/>
+          </a:effectRef>
+          <a:fontRef idx="minor">
+            <a:schemeClr val="tx1"/>
+          </a:fontRef>
+        </p:style>
+        <p:txBody>
+          <a:bodyPr rtlCol="0" anchor="ctr"/>
+          <a:lstStyle/>
+          <a:p>
+            <a:pPr algn="ctr"/>
+            <a:endParaRPr lang="en-US"/>
+          </a:p>
+        </p:txBody>
+      </p:sp>
+      <p:cxnSp>
+        <p:nvCxnSpPr>
+          <p:cNvPr id="5" name="Straight Connector 4">
+            <a:extLst>
+              <a:ext uri="{FF2B5EF4-FFF2-40B4-BE49-F238E27FC236}">
+                <a16:creationId xmlns:a16="http://schemas.microsoft.com/office/drawing/2014/main" id="{4C664D0D-D411-44B7-96D7-2A1DE47A047B}"/>
+              </a:ext>
+            </a:extLst>
+          </p:cNvPr>
+          <p:cNvCxnSpPr>
+            <a:cxnSpLocks/>
+            <a:stCxn id="6" idx="6"/>
+          </p:cNvCxnSpPr>
+          <p:nvPr/>
+        </p:nvCxnSpPr>
+        <p:spPr>
+          <a:xfrm>
+            <a:off x="2630658" y="2074985"/>
+            <a:ext cx="6794696" cy="161778"/>
+          </a:xfrm>
+          <a:prstGeom prst="line">
+            <a:avLst/>
+          </a:prstGeom>
+          <a:ln w="38100">
+            <a:solidFill>
+              <a:schemeClr val="accent2"/>
+            </a:solidFill>
+          </a:ln>
+        </p:spPr>
+        <p:style>
+          <a:lnRef idx="1">
+            <a:schemeClr val="accent1"/>
+          </a:lnRef>
+          <a:fillRef idx="0">
+            <a:schemeClr val="accent1"/>
+          </a:fillRef>
+          <a:effectRef idx="0">
+            <a:schemeClr val="accent1"/>
+          </a:effectRef>
+          <a:fontRef idx="minor">
+            <a:schemeClr val="tx1"/>
+          </a:fontRef>
+        </p:style>
+      </p:cxnSp>
+      <p:sp>
+        <p:nvSpPr>
+          <p:cNvPr id="6" name="Oval 5">
+            <a:extLst>
+              <a:ext uri="{FF2B5EF4-FFF2-40B4-BE49-F238E27FC236}">
+                <a16:creationId xmlns:a16="http://schemas.microsoft.com/office/drawing/2014/main" id="{B6BE42D2-E974-4D84-9758-1467385A970C}"/>
+              </a:ext>
+            </a:extLst>
+          </p:cNvPr>
+          <p:cNvSpPr/>
+          <p:nvPr/>
+        </p:nvSpPr>
+        <p:spPr>
+          <a:xfrm>
+            <a:off x="1969477" y="1744394"/>
+            <a:ext cx="661181" cy="661181"/>
+          </a:xfrm>
+          <a:prstGeom prst="ellipse">
+            <a:avLst/>
+          </a:prstGeom>
+          <a:noFill/>
+          <a:ln w="38100">
+            <a:solidFill>
+              <a:schemeClr val="accent2"/>
+            </a:solidFill>
+          </a:ln>
+        </p:spPr>
+        <p:style>
+          <a:lnRef idx="2">
+            <a:schemeClr val="accent1">
+              <a:shade val="50000"/>
+            </a:schemeClr>
+          </a:lnRef>
+          <a:fillRef idx="1">
+            <a:schemeClr val="accent1"/>
+          </a:fillRef>
+          <a:effectRef idx="0">
+            <a:schemeClr val="accent1"/>
+          </a:effectRef>
+          <a:fontRef idx="minor">
+            <a:schemeClr val="lt1"/>
+          </a:fontRef>
+        </p:style>
+        <p:txBody>
+          <a:bodyPr rtlCol="0" anchor="ctr"/>
+          <a:lstStyle/>
+          <a:p>
+            <a:pPr algn="ctr"/>
+            <a:endParaRPr lang="en-US"/>
+          </a:p>
+        </p:txBody>
+      </p:sp>
+      <p:cxnSp>
+        <p:nvCxnSpPr>
+          <p:cNvPr id="8" name="Straight Connector 7">
+            <a:extLst>
+              <a:ext uri="{FF2B5EF4-FFF2-40B4-BE49-F238E27FC236}">
+                <a16:creationId xmlns:a16="http://schemas.microsoft.com/office/drawing/2014/main" id="{33304DD8-786A-4660-95F9-2FA72F647B15}"/>
+              </a:ext>
+            </a:extLst>
+          </p:cNvPr>
+          <p:cNvCxnSpPr>
+            <a:cxnSpLocks/>
+            <a:stCxn id="2" idx="0"/>
+          </p:cNvCxnSpPr>
+          <p:nvPr/>
+        </p:nvCxnSpPr>
+        <p:spPr>
+          <a:xfrm flipH="1">
+            <a:off x="4642338" y="2119530"/>
+            <a:ext cx="134216" cy="1453664"/>
+          </a:xfrm>
+          <a:prstGeom prst="line">
+            <a:avLst/>
+          </a:prstGeom>
+          <a:ln w="38100">
+            <a:solidFill>
+              <a:schemeClr val="accent2"/>
+            </a:solidFill>
+          </a:ln>
+        </p:spPr>
+        <p:style>
+          <a:lnRef idx="1">
+            <a:schemeClr val="accent1"/>
+          </a:lnRef>
+          <a:fillRef idx="0">
+            <a:schemeClr val="accent1"/>
+          </a:fillRef>
+          <a:effectRef idx="0">
+            <a:schemeClr val="accent1"/>
+          </a:effectRef>
+          <a:fontRef idx="minor">
+            <a:schemeClr val="tx1"/>
+          </a:fontRef>
+        </p:style>
+      </p:cxnSp>
+      <p:cxnSp>
+        <p:nvCxnSpPr>
+          <p:cNvPr id="11" name="Straight Connector 10">
+            <a:extLst>
+              <a:ext uri="{FF2B5EF4-FFF2-40B4-BE49-F238E27FC236}">
+                <a16:creationId xmlns:a16="http://schemas.microsoft.com/office/drawing/2014/main" id="{C20C6BAB-D054-4BB4-9043-44E1D300F35C}"/>
+              </a:ext>
+            </a:extLst>
+          </p:cNvPr>
+          <p:cNvCxnSpPr>
+            <a:cxnSpLocks/>
+          </p:cNvCxnSpPr>
+          <p:nvPr/>
+        </p:nvCxnSpPr>
+        <p:spPr>
+          <a:xfrm>
+            <a:off x="9425354" y="1547446"/>
+            <a:ext cx="0" cy="1298916"/>
+          </a:xfrm>
+          <a:prstGeom prst="line">
+            <a:avLst/>
+          </a:prstGeom>
+          <a:ln w="38100">
+            <a:solidFill>
+              <a:schemeClr val="accent2"/>
+            </a:solidFill>
+          </a:ln>
+        </p:spPr>
+        <p:style>
+          <a:lnRef idx="1">
+            <a:schemeClr val="accent1"/>
+          </a:lnRef>
+          <a:fillRef idx="0">
+            <a:schemeClr val="accent1"/>
+          </a:fillRef>
+          <a:effectRef idx="0">
+            <a:schemeClr val="accent1"/>
+          </a:effectRef>
+          <a:fontRef idx="minor">
+            <a:schemeClr val="tx1"/>
+          </a:fontRef>
+        </p:style>
+      </p:cxnSp>
+      <p:sp>
+        <p:nvSpPr>
+          <p:cNvPr id="14" name="Oval 13">
+            <a:extLst>
+              <a:ext uri="{FF2B5EF4-FFF2-40B4-BE49-F238E27FC236}">
+                <a16:creationId xmlns:a16="http://schemas.microsoft.com/office/drawing/2014/main" id="{A0B3131F-11EA-41C5-A99C-2C6527CE5272}"/>
+              </a:ext>
+            </a:extLst>
+          </p:cNvPr>
+          <p:cNvSpPr/>
+          <p:nvPr/>
+        </p:nvSpPr>
+        <p:spPr>
+          <a:xfrm>
+            <a:off x="4311747" y="3558432"/>
+            <a:ext cx="661181" cy="661181"/>
+          </a:xfrm>
+          <a:prstGeom prst="ellipse">
+            <a:avLst/>
+          </a:prstGeom>
+          <a:noFill/>
+          <a:ln w="38100">
+            <a:solidFill>
+              <a:schemeClr val="accent2"/>
+            </a:solidFill>
+          </a:ln>
+        </p:spPr>
+        <p:style>
+          <a:lnRef idx="2">
+            <a:schemeClr val="accent1">
+              <a:shade val="50000"/>
+            </a:schemeClr>
+          </a:lnRef>
+          <a:fillRef idx="1">
+            <a:schemeClr val="accent1"/>
+          </a:fillRef>
+          <a:effectRef idx="0">
+            <a:schemeClr val="accent1"/>
+          </a:effectRef>
+          <a:fontRef idx="minor">
+            <a:schemeClr val="lt1"/>
+          </a:fontRef>
+        </p:style>
+        <p:txBody>
+          <a:bodyPr rtlCol="0" anchor="ctr"/>
+          <a:lstStyle/>
+          <a:p>
+            <a:pPr algn="ctr"/>
+            <a:endParaRPr lang="en-US"/>
+          </a:p>
+        </p:txBody>
+      </p:sp>
+      <p:cxnSp>
+        <p:nvCxnSpPr>
+          <p:cNvPr id="15" name="Straight Connector 14">
+            <a:extLst>
+              <a:ext uri="{FF2B5EF4-FFF2-40B4-BE49-F238E27FC236}">
+                <a16:creationId xmlns:a16="http://schemas.microsoft.com/office/drawing/2014/main" id="{4E3C74E7-023F-4E70-BA4D-847EEC9B7893}"/>
+              </a:ext>
+            </a:extLst>
+          </p:cNvPr>
+          <p:cNvCxnSpPr>
+            <a:cxnSpLocks/>
+          </p:cNvCxnSpPr>
+          <p:nvPr/>
+        </p:nvCxnSpPr>
+        <p:spPr>
+          <a:xfrm>
+            <a:off x="9425354" y="3007442"/>
+            <a:ext cx="0" cy="1459048"/>
+          </a:xfrm>
+          <a:prstGeom prst="line">
+            <a:avLst/>
+          </a:prstGeom>
+          <a:ln w="38100">
+            <a:solidFill>
+              <a:schemeClr val="accent2"/>
+            </a:solidFill>
+            <a:prstDash val="lgDash"/>
+          </a:ln>
+        </p:spPr>
+        <p:style>
+          <a:lnRef idx="1">
+            <a:schemeClr val="accent1"/>
+          </a:lnRef>
+          <a:fillRef idx="0">
+            <a:schemeClr val="accent1"/>
+          </a:fillRef>
+          <a:effectRef idx="0">
+            <a:schemeClr val="accent1"/>
+          </a:effectRef>
+          <a:fontRef idx="minor">
+            <a:schemeClr val="tx1"/>
+          </a:fontRef>
+        </p:style>
+      </p:cxnSp>
+      <p:cxnSp>
+        <p:nvCxnSpPr>
+          <p:cNvPr id="19" name="Straight Connector 18">
+            <a:extLst>
+              <a:ext uri="{FF2B5EF4-FFF2-40B4-BE49-F238E27FC236}">
+                <a16:creationId xmlns:a16="http://schemas.microsoft.com/office/drawing/2014/main" id="{9D1F0B83-2149-4ABD-BADE-A244FB74577B}"/>
+              </a:ext>
+            </a:extLst>
+          </p:cNvPr>
+          <p:cNvCxnSpPr>
+            <a:cxnSpLocks/>
+          </p:cNvCxnSpPr>
+          <p:nvPr/>
+        </p:nvCxnSpPr>
+        <p:spPr>
+          <a:xfrm>
+            <a:off x="9425354" y="458845"/>
+            <a:ext cx="0" cy="1459048"/>
+          </a:xfrm>
+          <a:prstGeom prst="line">
+            <a:avLst/>
+          </a:prstGeom>
+          <a:ln w="38100">
+            <a:solidFill>
+              <a:schemeClr val="accent2"/>
+            </a:solidFill>
+            <a:prstDash val="lgDash"/>
+          </a:ln>
+        </p:spPr>
+        <p:style>
+          <a:lnRef idx="1">
+            <a:schemeClr val="accent1"/>
+          </a:lnRef>
+          <a:fillRef idx="0">
+            <a:schemeClr val="accent1"/>
+          </a:fillRef>
+          <a:effectRef idx="0">
+            <a:schemeClr val="accent1"/>
+          </a:effectRef>
+          <a:fontRef idx="minor">
+            <a:schemeClr val="tx1"/>
+          </a:fontRef>
+        </p:style>
+      </p:cxnSp>
       <p:pic>
         <p:nvPicPr>
-          <p:cNvPr id="4" name="Picture 3">
-            <a:extLst>
-              <a:ext uri="{FF2B5EF4-FFF2-40B4-BE49-F238E27FC236}">
-                <a16:creationId xmlns:a16="http://schemas.microsoft.com/office/drawing/2014/main" id="{26C77469-4015-42C5-B65F-CAEE17F9D950}"/>
+          <p:cNvPr id="21" name="Graphic 20" descr="House">
+            <a:extLst>
+              <a:ext uri="{FF2B5EF4-FFF2-40B4-BE49-F238E27FC236}">
+                <a16:creationId xmlns:a16="http://schemas.microsoft.com/office/drawing/2014/main" id="{3B7DB77A-1ED2-4485-849B-FB13FC94F656}"/>
               </a:ext>
             </a:extLst>
           </p:cNvPr>
@@ -3336,21 +3760,1594 @@
           <p:nvPr/>
         </p:nvPicPr>
         <p:blipFill>
-          <a:blip r:embed="rId2"/>
+          <a:blip r:embed="rId2">
+            <a:extLst>
+              <a:ext uri="{28A0092B-C50C-407E-A947-70E740481C1C}">
+                <a14:useLocalDpi xmlns:a14="http://schemas.microsoft.com/office/drawing/2010/main" val="0"/>
+              </a:ext>
+              <a:ext uri="{96DAC541-7B7A-43D3-8B79-37D633B846F1}">
+                <asvg:svgBlip xmlns:asvg="http://schemas.microsoft.com/office/drawing/2016/SVG/main" r:embed="rId3"/>
+              </a:ext>
+            </a:extLst>
+          </a:blip>
           <a:stretch>
             <a:fillRect/>
           </a:stretch>
         </p:blipFill>
         <p:spPr>
           <a:xfrm>
-            <a:off x="-982133" y="-315073"/>
-            <a:ext cx="13174133" cy="6968634"/>
+            <a:off x="4120582" y="2374779"/>
+            <a:ext cx="431453" cy="431453"/>
           </a:xfrm>
           <a:prstGeom prst="rect">
             <a:avLst/>
           </a:prstGeom>
         </p:spPr>
       </p:pic>
+      <p:sp>
+        <p:nvSpPr>
+          <p:cNvPr id="22" name="Oval 21">
+            <a:extLst>
+              <a:ext uri="{FF2B5EF4-FFF2-40B4-BE49-F238E27FC236}">
+                <a16:creationId xmlns:a16="http://schemas.microsoft.com/office/drawing/2014/main" id="{7D4F706E-0406-470D-BA66-EAFF58A4A987}"/>
+              </a:ext>
+            </a:extLst>
+          </p:cNvPr>
+          <p:cNvSpPr/>
+          <p:nvPr/>
+        </p:nvSpPr>
+        <p:spPr>
+          <a:xfrm>
+            <a:off x="4434801" y="2243318"/>
+            <a:ext cx="188548" cy="186135"/>
+          </a:xfrm>
+          <a:prstGeom prst="ellipse">
+            <a:avLst/>
+          </a:prstGeom>
+          <a:solidFill>
+            <a:schemeClr val="accent6"/>
+          </a:solidFill>
+        </p:spPr>
+        <p:style>
+          <a:lnRef idx="2">
+            <a:schemeClr val="accent1">
+              <a:shade val="50000"/>
+            </a:schemeClr>
+          </a:lnRef>
+          <a:fillRef idx="1">
+            <a:schemeClr val="accent1"/>
+          </a:fillRef>
+          <a:effectRef idx="0">
+            <a:schemeClr val="accent1"/>
+          </a:effectRef>
+          <a:fontRef idx="minor">
+            <a:schemeClr val="lt1"/>
+          </a:fontRef>
+        </p:style>
+        <p:txBody>
+          <a:bodyPr rtlCol="0" anchor="ctr"/>
+          <a:lstStyle/>
+          <a:p>
+            <a:pPr algn="ctr"/>
+            <a:endParaRPr lang="en-US"/>
+          </a:p>
+        </p:txBody>
+      </p:sp>
+      <p:sp>
+        <p:nvSpPr>
+          <p:cNvPr id="23" name="Oval 22">
+            <a:extLst>
+              <a:ext uri="{FF2B5EF4-FFF2-40B4-BE49-F238E27FC236}">
+                <a16:creationId xmlns:a16="http://schemas.microsoft.com/office/drawing/2014/main" id="{A0BE2BF7-11B2-4C3E-9988-ACA96AB4CFFE}"/>
+              </a:ext>
+            </a:extLst>
+          </p:cNvPr>
+          <p:cNvSpPr/>
+          <p:nvPr/>
+        </p:nvSpPr>
+        <p:spPr>
+          <a:xfrm>
+            <a:off x="4680925" y="2026462"/>
+            <a:ext cx="188548" cy="186135"/>
+          </a:xfrm>
+          <a:prstGeom prst="ellipse">
+            <a:avLst/>
+          </a:prstGeom>
+          <a:solidFill>
+            <a:schemeClr val="accent6"/>
+          </a:solidFill>
+        </p:spPr>
+        <p:style>
+          <a:lnRef idx="2">
+            <a:schemeClr val="accent1">
+              <a:shade val="50000"/>
+            </a:schemeClr>
+          </a:lnRef>
+          <a:fillRef idx="1">
+            <a:schemeClr val="accent1"/>
+          </a:fillRef>
+          <a:effectRef idx="0">
+            <a:schemeClr val="accent1"/>
+          </a:effectRef>
+          <a:fontRef idx="minor">
+            <a:schemeClr val="lt1"/>
+          </a:fontRef>
+        </p:style>
+        <p:txBody>
+          <a:bodyPr rtlCol="0" anchor="ctr"/>
+          <a:lstStyle/>
+          <a:p>
+            <a:pPr algn="ctr"/>
+            <a:endParaRPr lang="en-US"/>
+          </a:p>
+        </p:txBody>
+      </p:sp>
+      <p:sp>
+        <p:nvSpPr>
+          <p:cNvPr id="24" name="Oval 23">
+            <a:extLst>
+              <a:ext uri="{FF2B5EF4-FFF2-40B4-BE49-F238E27FC236}">
+                <a16:creationId xmlns:a16="http://schemas.microsoft.com/office/drawing/2014/main" id="{C8203CC0-A766-483C-872A-CD35152B7798}"/>
+              </a:ext>
+            </a:extLst>
+          </p:cNvPr>
+          <p:cNvSpPr/>
+          <p:nvPr/>
+        </p:nvSpPr>
+        <p:spPr>
+          <a:xfrm>
+            <a:off x="5390144" y="2041967"/>
+            <a:ext cx="188548" cy="186135"/>
+          </a:xfrm>
+          <a:prstGeom prst="ellipse">
+            <a:avLst/>
+          </a:prstGeom>
+          <a:solidFill>
+            <a:schemeClr val="accent6"/>
+          </a:solidFill>
+        </p:spPr>
+        <p:style>
+          <a:lnRef idx="2">
+            <a:schemeClr val="accent1">
+              <a:shade val="50000"/>
+            </a:schemeClr>
+          </a:lnRef>
+          <a:fillRef idx="1">
+            <a:schemeClr val="accent1"/>
+          </a:fillRef>
+          <a:effectRef idx="0">
+            <a:schemeClr val="accent1"/>
+          </a:effectRef>
+          <a:fontRef idx="minor">
+            <a:schemeClr val="lt1"/>
+          </a:fontRef>
+        </p:style>
+        <p:txBody>
+          <a:bodyPr rtlCol="0" anchor="ctr"/>
+          <a:lstStyle/>
+          <a:p>
+            <a:pPr algn="ctr"/>
+            <a:endParaRPr lang="en-US"/>
+          </a:p>
+        </p:txBody>
+      </p:sp>
+      <p:sp>
+        <p:nvSpPr>
+          <p:cNvPr id="25" name="Oval 24">
+            <a:extLst>
+              <a:ext uri="{FF2B5EF4-FFF2-40B4-BE49-F238E27FC236}">
+                <a16:creationId xmlns:a16="http://schemas.microsoft.com/office/drawing/2014/main" id="{AF42A27D-FAA3-4D39-BD74-AADF5DF5FEB6}"/>
+              </a:ext>
+            </a:extLst>
+          </p:cNvPr>
+          <p:cNvSpPr/>
+          <p:nvPr/>
+        </p:nvSpPr>
+        <p:spPr>
+          <a:xfrm>
+            <a:off x="6155968" y="2024706"/>
+            <a:ext cx="277173" cy="267024"/>
+          </a:xfrm>
+          <a:prstGeom prst="ellipse">
+            <a:avLst/>
+          </a:prstGeom>
+          <a:solidFill>
+            <a:schemeClr val="accent6"/>
+          </a:solidFill>
+        </p:spPr>
+        <p:style>
+          <a:lnRef idx="2">
+            <a:schemeClr val="accent1">
+              <a:shade val="50000"/>
+            </a:schemeClr>
+          </a:lnRef>
+          <a:fillRef idx="1">
+            <a:schemeClr val="accent1"/>
+          </a:fillRef>
+          <a:effectRef idx="0">
+            <a:schemeClr val="accent1"/>
+          </a:effectRef>
+          <a:fontRef idx="minor">
+            <a:schemeClr val="lt1"/>
+          </a:fontRef>
+        </p:style>
+        <p:txBody>
+          <a:bodyPr rtlCol="0" anchor="ctr"/>
+          <a:lstStyle/>
+          <a:p>
+            <a:pPr algn="ctr"/>
+            <a:endParaRPr lang="en-US"/>
+          </a:p>
+        </p:txBody>
+      </p:sp>
+      <p:sp>
+        <p:nvSpPr>
+          <p:cNvPr id="26" name="Oval 25">
+            <a:extLst>
+              <a:ext uri="{FF2B5EF4-FFF2-40B4-BE49-F238E27FC236}">
+                <a16:creationId xmlns:a16="http://schemas.microsoft.com/office/drawing/2014/main" id="{A89AB68A-B3CE-47AB-8FA9-183C6394BE06}"/>
+              </a:ext>
+            </a:extLst>
+          </p:cNvPr>
+          <p:cNvSpPr/>
+          <p:nvPr/>
+        </p:nvSpPr>
+        <p:spPr>
+          <a:xfrm>
+            <a:off x="7413036" y="2103836"/>
+            <a:ext cx="188548" cy="186135"/>
+          </a:xfrm>
+          <a:prstGeom prst="ellipse">
+            <a:avLst/>
+          </a:prstGeom>
+          <a:solidFill>
+            <a:schemeClr val="accent6"/>
+          </a:solidFill>
+        </p:spPr>
+        <p:style>
+          <a:lnRef idx="2">
+            <a:schemeClr val="accent1">
+              <a:shade val="50000"/>
+            </a:schemeClr>
+          </a:lnRef>
+          <a:fillRef idx="1">
+            <a:schemeClr val="accent1"/>
+          </a:fillRef>
+          <a:effectRef idx="0">
+            <a:schemeClr val="accent1"/>
+          </a:effectRef>
+          <a:fontRef idx="minor">
+            <a:schemeClr val="lt1"/>
+          </a:fontRef>
+        </p:style>
+        <p:txBody>
+          <a:bodyPr rtlCol="0" anchor="ctr"/>
+          <a:lstStyle/>
+          <a:p>
+            <a:pPr algn="ctr"/>
+            <a:endParaRPr lang="en-US"/>
+          </a:p>
+        </p:txBody>
+      </p:sp>
+      <p:sp>
+        <p:nvSpPr>
+          <p:cNvPr id="27" name="Oval 26">
+            <a:extLst>
+              <a:ext uri="{FF2B5EF4-FFF2-40B4-BE49-F238E27FC236}">
+                <a16:creationId xmlns:a16="http://schemas.microsoft.com/office/drawing/2014/main" id="{2F03E668-3464-4433-906A-0E7433FB1D9A}"/>
+              </a:ext>
+            </a:extLst>
+          </p:cNvPr>
+          <p:cNvSpPr/>
+          <p:nvPr/>
+        </p:nvSpPr>
+        <p:spPr>
+          <a:xfrm>
+            <a:off x="9331081" y="2143695"/>
+            <a:ext cx="188548" cy="186135"/>
+          </a:xfrm>
+          <a:prstGeom prst="ellipse">
+            <a:avLst/>
+          </a:prstGeom>
+          <a:solidFill>
+            <a:schemeClr val="accent6"/>
+          </a:solidFill>
+        </p:spPr>
+        <p:style>
+          <a:lnRef idx="2">
+            <a:schemeClr val="accent1">
+              <a:shade val="50000"/>
+            </a:schemeClr>
+          </a:lnRef>
+          <a:fillRef idx="1">
+            <a:schemeClr val="accent1"/>
+          </a:fillRef>
+          <a:effectRef idx="0">
+            <a:schemeClr val="accent1"/>
+          </a:effectRef>
+          <a:fontRef idx="minor">
+            <a:schemeClr val="lt1"/>
+          </a:fontRef>
+        </p:style>
+        <p:txBody>
+          <a:bodyPr rtlCol="0" anchor="ctr"/>
+          <a:lstStyle/>
+          <a:p>
+            <a:pPr algn="ctr"/>
+            <a:endParaRPr lang="en-US"/>
+          </a:p>
+        </p:txBody>
+      </p:sp>
+      <p:sp>
+        <p:nvSpPr>
+          <p:cNvPr id="28" name="Oval 27">
+            <a:extLst>
+              <a:ext uri="{FF2B5EF4-FFF2-40B4-BE49-F238E27FC236}">
+                <a16:creationId xmlns:a16="http://schemas.microsoft.com/office/drawing/2014/main" id="{DD28CC4F-46C0-40BD-9B4B-3662E81C9922}"/>
+              </a:ext>
+            </a:extLst>
+          </p:cNvPr>
+          <p:cNvSpPr/>
+          <p:nvPr/>
+        </p:nvSpPr>
+        <p:spPr>
+          <a:xfrm>
+            <a:off x="9332049" y="2846352"/>
+            <a:ext cx="188548" cy="186135"/>
+          </a:xfrm>
+          <a:prstGeom prst="ellipse">
+            <a:avLst/>
+          </a:prstGeom>
+          <a:solidFill>
+            <a:schemeClr val="accent6"/>
+          </a:solidFill>
+        </p:spPr>
+        <p:style>
+          <a:lnRef idx="2">
+            <a:schemeClr val="accent1">
+              <a:shade val="50000"/>
+            </a:schemeClr>
+          </a:lnRef>
+          <a:fillRef idx="1">
+            <a:schemeClr val="accent1"/>
+          </a:fillRef>
+          <a:effectRef idx="0">
+            <a:schemeClr val="accent1"/>
+          </a:effectRef>
+          <a:fontRef idx="minor">
+            <a:schemeClr val="lt1"/>
+          </a:fontRef>
+        </p:style>
+        <p:txBody>
+          <a:bodyPr rtlCol="0" anchor="ctr"/>
+          <a:lstStyle/>
+          <a:p>
+            <a:pPr algn="ctr"/>
+            <a:endParaRPr lang="en-US"/>
+          </a:p>
+        </p:txBody>
+      </p:sp>
+      <p:sp>
+        <p:nvSpPr>
+          <p:cNvPr id="29" name="Oval 28">
+            <a:extLst>
+              <a:ext uri="{FF2B5EF4-FFF2-40B4-BE49-F238E27FC236}">
+                <a16:creationId xmlns:a16="http://schemas.microsoft.com/office/drawing/2014/main" id="{B852002F-4420-4894-ACAF-B0C5A8776391}"/>
+              </a:ext>
+            </a:extLst>
+          </p:cNvPr>
+          <p:cNvSpPr/>
+          <p:nvPr/>
+        </p:nvSpPr>
+        <p:spPr>
+          <a:xfrm>
+            <a:off x="5106564" y="5211028"/>
+            <a:ext cx="188548" cy="186135"/>
+          </a:xfrm>
+          <a:prstGeom prst="ellipse">
+            <a:avLst/>
+          </a:prstGeom>
+          <a:solidFill>
+            <a:schemeClr val="accent6"/>
+          </a:solidFill>
+        </p:spPr>
+        <p:style>
+          <a:lnRef idx="2">
+            <a:schemeClr val="accent1">
+              <a:shade val="50000"/>
+            </a:schemeClr>
+          </a:lnRef>
+          <a:fillRef idx="1">
+            <a:schemeClr val="accent1"/>
+          </a:fillRef>
+          <a:effectRef idx="0">
+            <a:schemeClr val="accent1"/>
+          </a:effectRef>
+          <a:fontRef idx="minor">
+            <a:schemeClr val="lt1"/>
+          </a:fontRef>
+        </p:style>
+        <p:txBody>
+          <a:bodyPr rtlCol="0" anchor="ctr"/>
+          <a:lstStyle/>
+          <a:p>
+            <a:pPr algn="ctr"/>
+            <a:endParaRPr lang="en-US"/>
+          </a:p>
+        </p:txBody>
+      </p:sp>
+      <p:sp>
+        <p:nvSpPr>
+          <p:cNvPr id="30" name="Oval 29">
+            <a:extLst>
+              <a:ext uri="{FF2B5EF4-FFF2-40B4-BE49-F238E27FC236}">
+                <a16:creationId xmlns:a16="http://schemas.microsoft.com/office/drawing/2014/main" id="{0103A419-1F3E-416F-AD07-3C0B32A4EDD5}"/>
+              </a:ext>
+            </a:extLst>
+          </p:cNvPr>
+          <p:cNvSpPr/>
+          <p:nvPr/>
+        </p:nvSpPr>
+        <p:spPr>
+          <a:xfrm>
+            <a:off x="3923802" y="2018253"/>
+            <a:ext cx="188548" cy="186135"/>
+          </a:xfrm>
+          <a:prstGeom prst="ellipse">
+            <a:avLst/>
+          </a:prstGeom>
+          <a:solidFill>
+            <a:srgbClr val="FF0000"/>
+          </a:solidFill>
+        </p:spPr>
+        <p:style>
+          <a:lnRef idx="2">
+            <a:schemeClr val="accent1">
+              <a:shade val="50000"/>
+            </a:schemeClr>
+          </a:lnRef>
+          <a:fillRef idx="1">
+            <a:schemeClr val="accent1"/>
+          </a:fillRef>
+          <a:effectRef idx="0">
+            <a:schemeClr val="accent1"/>
+          </a:effectRef>
+          <a:fontRef idx="minor">
+            <a:schemeClr val="lt1"/>
+          </a:fontRef>
+        </p:style>
+        <p:txBody>
+          <a:bodyPr rtlCol="0" anchor="ctr"/>
+          <a:lstStyle/>
+          <a:p>
+            <a:pPr algn="ctr"/>
+            <a:endParaRPr lang="en-US"/>
+          </a:p>
+        </p:txBody>
+      </p:sp>
+      <p:sp>
+        <p:nvSpPr>
+          <p:cNvPr id="31" name="Oval 30">
+            <a:extLst>
+              <a:ext uri="{FF2B5EF4-FFF2-40B4-BE49-F238E27FC236}">
+                <a16:creationId xmlns:a16="http://schemas.microsoft.com/office/drawing/2014/main" id="{FCB0260B-9F05-4D3F-8E0D-C4F8B0F98F37}"/>
+              </a:ext>
+            </a:extLst>
+          </p:cNvPr>
+          <p:cNvSpPr/>
+          <p:nvPr/>
+        </p:nvSpPr>
+        <p:spPr>
+          <a:xfrm>
+            <a:off x="4615172" y="2745223"/>
+            <a:ext cx="188548" cy="186135"/>
+          </a:xfrm>
+          <a:prstGeom prst="ellipse">
+            <a:avLst/>
+          </a:prstGeom>
+          <a:solidFill>
+            <a:srgbClr val="FF0000"/>
+          </a:solidFill>
+        </p:spPr>
+        <p:style>
+          <a:lnRef idx="2">
+            <a:schemeClr val="accent1">
+              <a:shade val="50000"/>
+            </a:schemeClr>
+          </a:lnRef>
+          <a:fillRef idx="1">
+            <a:schemeClr val="accent1"/>
+          </a:fillRef>
+          <a:effectRef idx="0">
+            <a:schemeClr val="accent1"/>
+          </a:effectRef>
+          <a:fontRef idx="minor">
+            <a:schemeClr val="lt1"/>
+          </a:fontRef>
+        </p:style>
+        <p:txBody>
+          <a:bodyPr rtlCol="0" anchor="ctr"/>
+          <a:lstStyle/>
+          <a:p>
+            <a:pPr algn="ctr"/>
+            <a:endParaRPr lang="en-US"/>
+          </a:p>
+        </p:txBody>
+      </p:sp>
+      <p:sp>
+        <p:nvSpPr>
+          <p:cNvPr id="32" name="TextBox 31">
+            <a:extLst>
+              <a:ext uri="{FF2B5EF4-FFF2-40B4-BE49-F238E27FC236}">
+                <a16:creationId xmlns:a16="http://schemas.microsoft.com/office/drawing/2014/main" id="{21F7D8E4-A898-488D-A6C5-D6CB6E1F9BBA}"/>
+              </a:ext>
+            </a:extLst>
+          </p:cNvPr>
+          <p:cNvSpPr txBox="1"/>
+          <p:nvPr/>
+        </p:nvSpPr>
+        <p:spPr>
+          <a:xfrm>
+            <a:off x="3504282" y="2570087"/>
+            <a:ext cx="780634" cy="369332"/>
+          </a:xfrm>
+          <a:prstGeom prst="rect">
+            <a:avLst/>
+          </a:prstGeom>
+          <a:noFill/>
+        </p:spPr>
+        <p:txBody>
+          <a:bodyPr wrap="square" rtlCol="0">
+            <a:spAutoFit/>
+          </a:bodyPr>
+          <a:lstStyle/>
+          <a:p>
+            <a:r>
+              <a:rPr lang="en-US" dirty="0"/>
+              <a:t>home</a:t>
+            </a:r>
+          </a:p>
+        </p:txBody>
+      </p:sp>
+      <p:sp>
+        <p:nvSpPr>
+          <p:cNvPr id="33" name="TextBox 32">
+            <a:extLst>
+              <a:ext uri="{FF2B5EF4-FFF2-40B4-BE49-F238E27FC236}">
+                <a16:creationId xmlns:a16="http://schemas.microsoft.com/office/drawing/2014/main" id="{3BB55D3E-1F63-4296-B743-4DF4EB588ADD}"/>
+              </a:ext>
+            </a:extLst>
+          </p:cNvPr>
+          <p:cNvSpPr txBox="1"/>
+          <p:nvPr/>
+        </p:nvSpPr>
+        <p:spPr>
+          <a:xfrm>
+            <a:off x="5413434" y="5397163"/>
+            <a:ext cx="1483455" cy="646331"/>
+          </a:xfrm>
+          <a:prstGeom prst="rect">
+            <a:avLst/>
+          </a:prstGeom>
+          <a:noFill/>
+        </p:spPr>
+        <p:txBody>
+          <a:bodyPr wrap="square" rtlCol="0">
+            <a:spAutoFit/>
+          </a:bodyPr>
+          <a:lstStyle/>
+          <a:p>
+            <a:r>
+              <a:rPr lang="en-US" dirty="0"/>
+              <a:t>Destination to the south</a:t>
+            </a:r>
+          </a:p>
+        </p:txBody>
+      </p:sp>
+      <p:sp>
+        <p:nvSpPr>
+          <p:cNvPr id="34" name="Oval 33">
+            <a:extLst>
+              <a:ext uri="{FF2B5EF4-FFF2-40B4-BE49-F238E27FC236}">
+                <a16:creationId xmlns:a16="http://schemas.microsoft.com/office/drawing/2014/main" id="{822ADA5D-4D97-4284-A7C7-2AC5FA6DC136}"/>
+              </a:ext>
+            </a:extLst>
+          </p:cNvPr>
+          <p:cNvSpPr/>
+          <p:nvPr/>
+        </p:nvSpPr>
+        <p:spPr>
+          <a:xfrm>
+            <a:off x="4191001" y="210002"/>
+            <a:ext cx="188548" cy="186135"/>
+          </a:xfrm>
+          <a:prstGeom prst="ellipse">
+            <a:avLst/>
+          </a:prstGeom>
+          <a:solidFill>
+            <a:schemeClr val="accent1">
+              <a:lumMod val="40000"/>
+              <a:lumOff val="60000"/>
+            </a:schemeClr>
+          </a:solidFill>
+        </p:spPr>
+        <p:style>
+          <a:lnRef idx="2">
+            <a:schemeClr val="accent1">
+              <a:shade val="50000"/>
+            </a:schemeClr>
+          </a:lnRef>
+          <a:fillRef idx="1">
+            <a:schemeClr val="accent1"/>
+          </a:fillRef>
+          <a:effectRef idx="0">
+            <a:schemeClr val="accent1"/>
+          </a:effectRef>
+          <a:fontRef idx="minor">
+            <a:schemeClr val="lt1"/>
+          </a:fontRef>
+        </p:style>
+        <p:txBody>
+          <a:bodyPr rtlCol="0" anchor="ctr"/>
+          <a:lstStyle/>
+          <a:p>
+            <a:pPr algn="ctr"/>
+            <a:endParaRPr lang="en-US"/>
+          </a:p>
+        </p:txBody>
+      </p:sp>
+      <p:sp>
+        <p:nvSpPr>
+          <p:cNvPr id="35" name="TextBox 34">
+            <a:extLst>
+              <a:ext uri="{FF2B5EF4-FFF2-40B4-BE49-F238E27FC236}">
+                <a16:creationId xmlns:a16="http://schemas.microsoft.com/office/drawing/2014/main" id="{0D2A243D-7D6E-4C06-BDEF-4C75820C0593}"/>
+              </a:ext>
+            </a:extLst>
+          </p:cNvPr>
+          <p:cNvSpPr txBox="1"/>
+          <p:nvPr/>
+        </p:nvSpPr>
+        <p:spPr>
+          <a:xfrm>
+            <a:off x="2853145" y="72971"/>
+            <a:ext cx="1483455" cy="646331"/>
+          </a:xfrm>
+          <a:prstGeom prst="rect">
+            <a:avLst/>
+          </a:prstGeom>
+          <a:noFill/>
+        </p:spPr>
+        <p:txBody>
+          <a:bodyPr wrap="square" rtlCol="0">
+            <a:spAutoFit/>
+          </a:bodyPr>
+          <a:lstStyle/>
+          <a:p>
+            <a:r>
+              <a:rPr lang="en-US" dirty="0"/>
+              <a:t>Destination to the north</a:t>
+            </a:r>
+          </a:p>
+        </p:txBody>
+      </p:sp>
+      <p:sp>
+        <p:nvSpPr>
+          <p:cNvPr id="36" name="Oval 35">
+            <a:extLst>
+              <a:ext uri="{FF2B5EF4-FFF2-40B4-BE49-F238E27FC236}">
+                <a16:creationId xmlns:a16="http://schemas.microsoft.com/office/drawing/2014/main" id="{884FCEE5-4A63-430C-8FBA-84F9625CC7F6}"/>
+              </a:ext>
+            </a:extLst>
+          </p:cNvPr>
+          <p:cNvSpPr/>
+          <p:nvPr/>
+        </p:nvSpPr>
+        <p:spPr>
+          <a:xfrm>
+            <a:off x="4918016" y="1506553"/>
+            <a:ext cx="188548" cy="186135"/>
+          </a:xfrm>
+          <a:prstGeom prst="ellipse">
+            <a:avLst/>
+          </a:prstGeom>
+          <a:solidFill>
+            <a:schemeClr val="accent1">
+              <a:lumMod val="40000"/>
+              <a:lumOff val="60000"/>
+            </a:schemeClr>
+          </a:solidFill>
+        </p:spPr>
+        <p:style>
+          <a:lnRef idx="2">
+            <a:schemeClr val="accent1">
+              <a:shade val="50000"/>
+            </a:schemeClr>
+          </a:lnRef>
+          <a:fillRef idx="1">
+            <a:schemeClr val="accent1"/>
+          </a:fillRef>
+          <a:effectRef idx="0">
+            <a:schemeClr val="accent1"/>
+          </a:effectRef>
+          <a:fontRef idx="minor">
+            <a:schemeClr val="lt1"/>
+          </a:fontRef>
+        </p:style>
+        <p:txBody>
+          <a:bodyPr rtlCol="0" anchor="ctr"/>
+          <a:lstStyle/>
+          <a:p>
+            <a:pPr algn="ctr"/>
+            <a:endParaRPr lang="en-US"/>
+          </a:p>
+        </p:txBody>
+      </p:sp>
+      <p:sp>
+        <p:nvSpPr>
+          <p:cNvPr id="37" name="Oval 36">
+            <a:extLst>
+              <a:ext uri="{FF2B5EF4-FFF2-40B4-BE49-F238E27FC236}">
+                <a16:creationId xmlns:a16="http://schemas.microsoft.com/office/drawing/2014/main" id="{27ADB03A-9182-495B-A3D2-AED5556E9C2C}"/>
+              </a:ext>
+            </a:extLst>
+          </p:cNvPr>
+          <p:cNvSpPr/>
+          <p:nvPr/>
+        </p:nvSpPr>
+        <p:spPr>
+          <a:xfrm>
+            <a:off x="5367202" y="1266378"/>
+            <a:ext cx="188548" cy="186135"/>
+          </a:xfrm>
+          <a:prstGeom prst="ellipse">
+            <a:avLst/>
+          </a:prstGeom>
+          <a:solidFill>
+            <a:schemeClr val="accent1">
+              <a:lumMod val="40000"/>
+              <a:lumOff val="60000"/>
+            </a:schemeClr>
+          </a:solidFill>
+        </p:spPr>
+        <p:style>
+          <a:lnRef idx="2">
+            <a:schemeClr val="accent1">
+              <a:shade val="50000"/>
+            </a:schemeClr>
+          </a:lnRef>
+          <a:fillRef idx="1">
+            <a:schemeClr val="accent1"/>
+          </a:fillRef>
+          <a:effectRef idx="0">
+            <a:schemeClr val="accent1"/>
+          </a:effectRef>
+          <a:fontRef idx="minor">
+            <a:schemeClr val="lt1"/>
+          </a:fontRef>
+        </p:style>
+        <p:txBody>
+          <a:bodyPr rtlCol="0" anchor="ctr"/>
+          <a:lstStyle/>
+          <a:p>
+            <a:pPr algn="ctr"/>
+            <a:endParaRPr lang="en-US"/>
+          </a:p>
+        </p:txBody>
+      </p:sp>
+      <p:sp>
+        <p:nvSpPr>
+          <p:cNvPr id="38" name="Oval 37">
+            <a:extLst>
+              <a:ext uri="{FF2B5EF4-FFF2-40B4-BE49-F238E27FC236}">
+                <a16:creationId xmlns:a16="http://schemas.microsoft.com/office/drawing/2014/main" id="{42922DAB-3E5C-4723-914F-C7A4DE6E3C20}"/>
+              </a:ext>
+            </a:extLst>
+          </p:cNvPr>
+          <p:cNvSpPr/>
+          <p:nvPr/>
+        </p:nvSpPr>
+        <p:spPr>
+          <a:xfrm>
+            <a:off x="5987955" y="1532013"/>
+            <a:ext cx="188548" cy="186135"/>
+          </a:xfrm>
+          <a:prstGeom prst="ellipse">
+            <a:avLst/>
+          </a:prstGeom>
+          <a:solidFill>
+            <a:schemeClr val="accent1">
+              <a:lumMod val="40000"/>
+              <a:lumOff val="60000"/>
+            </a:schemeClr>
+          </a:solidFill>
+        </p:spPr>
+        <p:style>
+          <a:lnRef idx="2">
+            <a:schemeClr val="accent1">
+              <a:shade val="50000"/>
+            </a:schemeClr>
+          </a:lnRef>
+          <a:fillRef idx="1">
+            <a:schemeClr val="accent1"/>
+          </a:fillRef>
+          <a:effectRef idx="0">
+            <a:schemeClr val="accent1"/>
+          </a:effectRef>
+          <a:fontRef idx="minor">
+            <a:schemeClr val="lt1"/>
+          </a:fontRef>
+        </p:style>
+        <p:txBody>
+          <a:bodyPr rtlCol="0" anchor="ctr"/>
+          <a:lstStyle/>
+          <a:p>
+            <a:pPr algn="ctr"/>
+            <a:endParaRPr lang="en-US"/>
+          </a:p>
+        </p:txBody>
+      </p:sp>
+      <p:sp>
+        <p:nvSpPr>
+          <p:cNvPr id="39" name="Oval 38">
+            <a:extLst>
+              <a:ext uri="{FF2B5EF4-FFF2-40B4-BE49-F238E27FC236}">
+                <a16:creationId xmlns:a16="http://schemas.microsoft.com/office/drawing/2014/main" id="{B2DCDACE-5232-41E4-A6AD-FC9138A94BAF}"/>
+              </a:ext>
+            </a:extLst>
+          </p:cNvPr>
+          <p:cNvSpPr/>
+          <p:nvPr/>
+        </p:nvSpPr>
+        <p:spPr>
+          <a:xfrm>
+            <a:off x="9331081" y="1386366"/>
+            <a:ext cx="188548" cy="186135"/>
+          </a:xfrm>
+          <a:prstGeom prst="ellipse">
+            <a:avLst/>
+          </a:prstGeom>
+          <a:solidFill>
+            <a:schemeClr val="accent1">
+              <a:lumMod val="40000"/>
+              <a:lumOff val="60000"/>
+            </a:schemeClr>
+          </a:solidFill>
+        </p:spPr>
+        <p:style>
+          <a:lnRef idx="2">
+            <a:schemeClr val="accent1">
+              <a:shade val="50000"/>
+            </a:schemeClr>
+          </a:lnRef>
+          <a:fillRef idx="1">
+            <a:schemeClr val="accent1"/>
+          </a:fillRef>
+          <a:effectRef idx="0">
+            <a:schemeClr val="accent1"/>
+          </a:effectRef>
+          <a:fontRef idx="minor">
+            <a:schemeClr val="lt1"/>
+          </a:fontRef>
+        </p:style>
+        <p:txBody>
+          <a:bodyPr rtlCol="0" anchor="ctr"/>
+          <a:lstStyle/>
+          <a:p>
+            <a:pPr algn="ctr"/>
+            <a:endParaRPr lang="en-US"/>
+          </a:p>
+        </p:txBody>
+      </p:sp>
+      <p:sp>
+        <p:nvSpPr>
+          <p:cNvPr id="40" name="Oval 39">
+            <a:extLst>
+              <a:ext uri="{FF2B5EF4-FFF2-40B4-BE49-F238E27FC236}">
+                <a16:creationId xmlns:a16="http://schemas.microsoft.com/office/drawing/2014/main" id="{92F51043-D533-4BE6-9C7A-03199A5C1AA3}"/>
+              </a:ext>
+            </a:extLst>
+          </p:cNvPr>
+          <p:cNvSpPr/>
+          <p:nvPr/>
+        </p:nvSpPr>
+        <p:spPr>
+          <a:xfrm>
+            <a:off x="6197301" y="2067041"/>
+            <a:ext cx="188548" cy="186135"/>
+          </a:xfrm>
+          <a:prstGeom prst="ellipse">
+            <a:avLst/>
+          </a:prstGeom>
+          <a:solidFill>
+            <a:schemeClr val="accent1">
+              <a:lumMod val="40000"/>
+              <a:lumOff val="60000"/>
+            </a:schemeClr>
+          </a:solidFill>
+        </p:spPr>
+        <p:style>
+          <a:lnRef idx="2">
+            <a:schemeClr val="accent1">
+              <a:shade val="50000"/>
+            </a:schemeClr>
+          </a:lnRef>
+          <a:fillRef idx="1">
+            <a:schemeClr val="accent1"/>
+          </a:fillRef>
+          <a:effectRef idx="0">
+            <a:schemeClr val="accent1"/>
+          </a:effectRef>
+          <a:fontRef idx="minor">
+            <a:schemeClr val="lt1"/>
+          </a:fontRef>
+        </p:style>
+        <p:txBody>
+          <a:bodyPr rtlCol="0" anchor="ctr"/>
+          <a:lstStyle/>
+          <a:p>
+            <a:pPr algn="ctr"/>
+            <a:endParaRPr lang="en-US"/>
+          </a:p>
+        </p:txBody>
+      </p:sp>
+      <p:sp>
+        <p:nvSpPr>
+          <p:cNvPr id="41" name="Oval 40">
+            <a:extLst>
+              <a:ext uri="{FF2B5EF4-FFF2-40B4-BE49-F238E27FC236}">
+                <a16:creationId xmlns:a16="http://schemas.microsoft.com/office/drawing/2014/main" id="{F7E5CCA3-D826-4AF3-BCC8-406FE7324F0D}"/>
+              </a:ext>
+            </a:extLst>
+          </p:cNvPr>
+          <p:cNvSpPr/>
+          <p:nvPr/>
+        </p:nvSpPr>
+        <p:spPr>
+          <a:xfrm>
+            <a:off x="7371703" y="2063454"/>
+            <a:ext cx="277173" cy="267024"/>
+          </a:xfrm>
+          <a:prstGeom prst="ellipse">
+            <a:avLst/>
+          </a:prstGeom>
+          <a:solidFill>
+            <a:schemeClr val="accent6"/>
+          </a:solidFill>
+        </p:spPr>
+        <p:style>
+          <a:lnRef idx="2">
+            <a:schemeClr val="accent1">
+              <a:shade val="50000"/>
+            </a:schemeClr>
+          </a:lnRef>
+          <a:fillRef idx="1">
+            <a:schemeClr val="accent1"/>
+          </a:fillRef>
+          <a:effectRef idx="0">
+            <a:schemeClr val="accent1"/>
+          </a:effectRef>
+          <a:fontRef idx="minor">
+            <a:schemeClr val="lt1"/>
+          </a:fontRef>
+        </p:style>
+        <p:txBody>
+          <a:bodyPr rtlCol="0" anchor="ctr"/>
+          <a:lstStyle/>
+          <a:p>
+            <a:pPr algn="ctr"/>
+            <a:endParaRPr lang="en-US"/>
+          </a:p>
+        </p:txBody>
+      </p:sp>
+      <p:sp>
+        <p:nvSpPr>
+          <p:cNvPr id="42" name="Oval 41">
+            <a:extLst>
+              <a:ext uri="{FF2B5EF4-FFF2-40B4-BE49-F238E27FC236}">
+                <a16:creationId xmlns:a16="http://schemas.microsoft.com/office/drawing/2014/main" id="{819BC977-3C6E-4E96-BDD7-6C39C4E2ADF6}"/>
+              </a:ext>
+            </a:extLst>
+          </p:cNvPr>
+          <p:cNvSpPr/>
+          <p:nvPr/>
+        </p:nvSpPr>
+        <p:spPr>
+          <a:xfrm>
+            <a:off x="7413036" y="2105789"/>
+            <a:ext cx="188548" cy="186135"/>
+          </a:xfrm>
+          <a:prstGeom prst="ellipse">
+            <a:avLst/>
+          </a:prstGeom>
+          <a:solidFill>
+            <a:schemeClr val="accent1">
+              <a:lumMod val="40000"/>
+              <a:lumOff val="60000"/>
+            </a:schemeClr>
+          </a:solidFill>
+        </p:spPr>
+        <p:style>
+          <a:lnRef idx="2">
+            <a:schemeClr val="accent1">
+              <a:shade val="50000"/>
+            </a:schemeClr>
+          </a:lnRef>
+          <a:fillRef idx="1">
+            <a:schemeClr val="accent1"/>
+          </a:fillRef>
+          <a:effectRef idx="0">
+            <a:schemeClr val="accent1"/>
+          </a:effectRef>
+          <a:fontRef idx="minor">
+            <a:schemeClr val="lt1"/>
+          </a:fontRef>
+        </p:style>
+        <p:txBody>
+          <a:bodyPr rtlCol="0" anchor="ctr"/>
+          <a:lstStyle/>
+          <a:p>
+            <a:pPr algn="ctr"/>
+            <a:endParaRPr lang="en-US"/>
+          </a:p>
+        </p:txBody>
+      </p:sp>
+      <p:sp>
+        <p:nvSpPr>
+          <p:cNvPr id="43" name="Oval 42">
+            <a:extLst>
+              <a:ext uri="{FF2B5EF4-FFF2-40B4-BE49-F238E27FC236}">
+                <a16:creationId xmlns:a16="http://schemas.microsoft.com/office/drawing/2014/main" id="{F85E0D4E-96E1-4052-84ED-0E42AB17A9A0}"/>
+              </a:ext>
+            </a:extLst>
+          </p:cNvPr>
+          <p:cNvSpPr/>
+          <p:nvPr/>
+        </p:nvSpPr>
+        <p:spPr>
+          <a:xfrm>
+            <a:off x="9309476" y="2109304"/>
+            <a:ext cx="277173" cy="267024"/>
+          </a:xfrm>
+          <a:prstGeom prst="ellipse">
+            <a:avLst/>
+          </a:prstGeom>
+          <a:solidFill>
+            <a:schemeClr val="accent6"/>
+          </a:solidFill>
+        </p:spPr>
+        <p:style>
+          <a:lnRef idx="2">
+            <a:schemeClr val="accent1">
+              <a:shade val="50000"/>
+            </a:schemeClr>
+          </a:lnRef>
+          <a:fillRef idx="1">
+            <a:schemeClr val="accent1"/>
+          </a:fillRef>
+          <a:effectRef idx="0">
+            <a:schemeClr val="accent1"/>
+          </a:effectRef>
+          <a:fontRef idx="minor">
+            <a:schemeClr val="lt1"/>
+          </a:fontRef>
+        </p:style>
+        <p:txBody>
+          <a:bodyPr rtlCol="0" anchor="ctr"/>
+          <a:lstStyle/>
+          <a:p>
+            <a:pPr algn="ctr"/>
+            <a:endParaRPr lang="en-US"/>
+          </a:p>
+        </p:txBody>
+      </p:sp>
+      <p:sp>
+        <p:nvSpPr>
+          <p:cNvPr id="44" name="Oval 43">
+            <a:extLst>
+              <a:ext uri="{FF2B5EF4-FFF2-40B4-BE49-F238E27FC236}">
+                <a16:creationId xmlns:a16="http://schemas.microsoft.com/office/drawing/2014/main" id="{2C79AA04-BF62-46F9-8259-565A34A9632F}"/>
+              </a:ext>
+            </a:extLst>
+          </p:cNvPr>
+          <p:cNvSpPr/>
+          <p:nvPr/>
+        </p:nvSpPr>
+        <p:spPr>
+          <a:xfrm>
+            <a:off x="9350809" y="2151639"/>
+            <a:ext cx="188548" cy="186135"/>
+          </a:xfrm>
+          <a:prstGeom prst="ellipse">
+            <a:avLst/>
+          </a:prstGeom>
+          <a:solidFill>
+            <a:schemeClr val="accent1">
+              <a:lumMod val="40000"/>
+              <a:lumOff val="60000"/>
+            </a:schemeClr>
+          </a:solidFill>
+        </p:spPr>
+        <p:style>
+          <a:lnRef idx="2">
+            <a:schemeClr val="accent1">
+              <a:shade val="50000"/>
+            </a:schemeClr>
+          </a:lnRef>
+          <a:fillRef idx="1">
+            <a:schemeClr val="accent1"/>
+          </a:fillRef>
+          <a:effectRef idx="0">
+            <a:schemeClr val="accent1"/>
+          </a:effectRef>
+          <a:fontRef idx="minor">
+            <a:schemeClr val="lt1"/>
+          </a:fontRef>
+        </p:style>
+        <p:txBody>
+          <a:bodyPr rtlCol="0" anchor="ctr"/>
+          <a:lstStyle/>
+          <a:p>
+            <a:pPr algn="ctr"/>
+            <a:endParaRPr lang="en-US"/>
+          </a:p>
+        </p:txBody>
+      </p:sp>
+      <p:sp>
+        <p:nvSpPr>
+          <p:cNvPr id="45" name="TextBox 44">
+            <a:extLst>
+              <a:ext uri="{FF2B5EF4-FFF2-40B4-BE49-F238E27FC236}">
+                <a16:creationId xmlns:a16="http://schemas.microsoft.com/office/drawing/2014/main" id="{B2FDF9A7-1C09-487A-B196-10C852DE9740}"/>
+              </a:ext>
+            </a:extLst>
+          </p:cNvPr>
+          <p:cNvSpPr txBox="1"/>
+          <p:nvPr/>
+        </p:nvSpPr>
+        <p:spPr>
+          <a:xfrm>
+            <a:off x="4218520" y="2057553"/>
+            <a:ext cx="337665" cy="369332"/>
+          </a:xfrm>
+          <a:prstGeom prst="rect">
+            <a:avLst/>
+          </a:prstGeom>
+          <a:noFill/>
+        </p:spPr>
+        <p:txBody>
+          <a:bodyPr wrap="square" rtlCol="0">
+            <a:spAutoFit/>
+          </a:bodyPr>
+          <a:lstStyle/>
+          <a:p>
+            <a:r>
+              <a:rPr lang="en-US" dirty="0"/>
+              <a:t>A</a:t>
+            </a:r>
+          </a:p>
+        </p:txBody>
+      </p:sp>
+      <p:sp>
+        <p:nvSpPr>
+          <p:cNvPr id="46" name="TextBox 45">
+            <a:extLst>
+              <a:ext uri="{FF2B5EF4-FFF2-40B4-BE49-F238E27FC236}">
+                <a16:creationId xmlns:a16="http://schemas.microsoft.com/office/drawing/2014/main" id="{638DB7CB-B513-412D-97D2-D28214C55DD8}"/>
+              </a:ext>
+            </a:extLst>
+          </p:cNvPr>
+          <p:cNvSpPr txBox="1"/>
+          <p:nvPr/>
+        </p:nvSpPr>
+        <p:spPr>
+          <a:xfrm>
+            <a:off x="4708635" y="2819478"/>
+            <a:ext cx="337665" cy="369332"/>
+          </a:xfrm>
+          <a:prstGeom prst="rect">
+            <a:avLst/>
+          </a:prstGeom>
+          <a:noFill/>
+        </p:spPr>
+        <p:txBody>
+          <a:bodyPr wrap="square" rtlCol="0">
+            <a:spAutoFit/>
+          </a:bodyPr>
+          <a:lstStyle/>
+          <a:p>
+            <a:r>
+              <a:rPr lang="en-US" dirty="0"/>
+              <a:t>B</a:t>
+            </a:r>
+          </a:p>
+        </p:txBody>
+      </p:sp>
+      <p:sp>
+        <p:nvSpPr>
+          <p:cNvPr id="47" name="TextBox 46">
+            <a:extLst>
+              <a:ext uri="{FF2B5EF4-FFF2-40B4-BE49-F238E27FC236}">
+                <a16:creationId xmlns:a16="http://schemas.microsoft.com/office/drawing/2014/main" id="{EF4EAB88-2CE6-424E-A06F-B64A405F3A60}"/>
+              </a:ext>
+            </a:extLst>
+          </p:cNvPr>
+          <p:cNvSpPr txBox="1"/>
+          <p:nvPr/>
+        </p:nvSpPr>
+        <p:spPr>
+          <a:xfrm>
+            <a:off x="3735625" y="1742038"/>
+            <a:ext cx="337665" cy="369332"/>
+          </a:xfrm>
+          <a:prstGeom prst="rect">
+            <a:avLst/>
+          </a:prstGeom>
+          <a:noFill/>
+        </p:spPr>
+        <p:txBody>
+          <a:bodyPr wrap="square" rtlCol="0">
+            <a:spAutoFit/>
+          </a:bodyPr>
+          <a:lstStyle/>
+          <a:p>
+            <a:r>
+              <a:rPr lang="en-US" dirty="0"/>
+              <a:t>C</a:t>
+            </a:r>
+          </a:p>
+        </p:txBody>
+      </p:sp>
+      <p:sp>
+        <p:nvSpPr>
+          <p:cNvPr id="48" name="TextBox 47">
+            <a:extLst>
+              <a:ext uri="{FF2B5EF4-FFF2-40B4-BE49-F238E27FC236}">
+                <a16:creationId xmlns:a16="http://schemas.microsoft.com/office/drawing/2014/main" id="{0BB28103-D9A2-4EFC-9072-177D557CEC3A}"/>
+              </a:ext>
+            </a:extLst>
+          </p:cNvPr>
+          <p:cNvSpPr txBox="1"/>
+          <p:nvPr/>
+        </p:nvSpPr>
+        <p:spPr>
+          <a:xfrm>
+            <a:off x="4517686" y="1743005"/>
+            <a:ext cx="337665" cy="369332"/>
+          </a:xfrm>
+          <a:prstGeom prst="rect">
+            <a:avLst/>
+          </a:prstGeom>
+          <a:noFill/>
+        </p:spPr>
+        <p:txBody>
+          <a:bodyPr wrap="square" rtlCol="0">
+            <a:spAutoFit/>
+          </a:bodyPr>
+          <a:lstStyle/>
+          <a:p>
+            <a:r>
+              <a:rPr lang="en-US" dirty="0"/>
+              <a:t>D</a:t>
+            </a:r>
+          </a:p>
+        </p:txBody>
+      </p:sp>
+      <p:sp>
+        <p:nvSpPr>
+          <p:cNvPr id="49" name="TextBox 48">
+            <a:extLst>
+              <a:ext uri="{FF2B5EF4-FFF2-40B4-BE49-F238E27FC236}">
+                <a16:creationId xmlns:a16="http://schemas.microsoft.com/office/drawing/2014/main" id="{89ADDA03-52F8-4CCE-9FF8-C99518C20D7D}"/>
+              </a:ext>
+            </a:extLst>
+          </p:cNvPr>
+          <p:cNvSpPr txBox="1"/>
+          <p:nvPr/>
+        </p:nvSpPr>
+        <p:spPr>
+          <a:xfrm>
+            <a:off x="5203609" y="1772884"/>
+            <a:ext cx="337665" cy="369332"/>
+          </a:xfrm>
+          <a:prstGeom prst="rect">
+            <a:avLst/>
+          </a:prstGeom>
+          <a:noFill/>
+        </p:spPr>
+        <p:txBody>
+          <a:bodyPr wrap="square" rtlCol="0">
+            <a:spAutoFit/>
+          </a:bodyPr>
+          <a:lstStyle/>
+          <a:p>
+            <a:r>
+              <a:rPr lang="en-US" dirty="0"/>
+              <a:t>E</a:t>
+            </a:r>
+          </a:p>
+        </p:txBody>
+      </p:sp>
+      <p:sp>
+        <p:nvSpPr>
+          <p:cNvPr id="50" name="TextBox 49">
+            <a:extLst>
+              <a:ext uri="{FF2B5EF4-FFF2-40B4-BE49-F238E27FC236}">
+                <a16:creationId xmlns:a16="http://schemas.microsoft.com/office/drawing/2014/main" id="{16A6DB49-0FAE-413C-88F0-54B4D2053DEF}"/>
+              </a:ext>
+            </a:extLst>
+          </p:cNvPr>
+          <p:cNvSpPr txBox="1"/>
+          <p:nvPr/>
+        </p:nvSpPr>
+        <p:spPr>
+          <a:xfrm>
+            <a:off x="5983645" y="1819288"/>
+            <a:ext cx="337665" cy="369332"/>
+          </a:xfrm>
+          <a:prstGeom prst="rect">
+            <a:avLst/>
+          </a:prstGeom>
+          <a:noFill/>
+        </p:spPr>
+        <p:txBody>
+          <a:bodyPr wrap="square" rtlCol="0">
+            <a:spAutoFit/>
+          </a:bodyPr>
+          <a:lstStyle/>
+          <a:p>
+            <a:r>
+              <a:rPr lang="en-US" dirty="0"/>
+              <a:t>F</a:t>
+            </a:r>
+          </a:p>
+        </p:txBody>
+      </p:sp>
+      <p:sp>
+        <p:nvSpPr>
+          <p:cNvPr id="51" name="TextBox 50">
+            <a:extLst>
+              <a:ext uri="{FF2B5EF4-FFF2-40B4-BE49-F238E27FC236}">
+                <a16:creationId xmlns:a16="http://schemas.microsoft.com/office/drawing/2014/main" id="{FED17183-324B-45A2-A27B-F7296E971FAD}"/>
+              </a:ext>
+            </a:extLst>
+          </p:cNvPr>
+          <p:cNvSpPr txBox="1"/>
+          <p:nvPr/>
+        </p:nvSpPr>
+        <p:spPr>
+          <a:xfrm>
+            <a:off x="7133915" y="1867285"/>
+            <a:ext cx="337665" cy="369332"/>
+          </a:xfrm>
+          <a:prstGeom prst="rect">
+            <a:avLst/>
+          </a:prstGeom>
+          <a:noFill/>
+        </p:spPr>
+        <p:txBody>
+          <a:bodyPr wrap="square" rtlCol="0">
+            <a:spAutoFit/>
+          </a:bodyPr>
+          <a:lstStyle/>
+          <a:p>
+            <a:r>
+              <a:rPr lang="en-US" dirty="0"/>
+              <a:t>G</a:t>
+            </a:r>
+          </a:p>
+        </p:txBody>
+      </p:sp>
+      <p:sp>
+        <p:nvSpPr>
+          <p:cNvPr id="52" name="TextBox 51">
+            <a:extLst>
+              <a:ext uri="{FF2B5EF4-FFF2-40B4-BE49-F238E27FC236}">
+                <a16:creationId xmlns:a16="http://schemas.microsoft.com/office/drawing/2014/main" id="{045FE48B-3F5C-451A-9256-01A0D8ED43FE}"/>
+              </a:ext>
+            </a:extLst>
+          </p:cNvPr>
+          <p:cNvSpPr txBox="1"/>
+          <p:nvPr/>
+        </p:nvSpPr>
+        <p:spPr>
+          <a:xfrm>
+            <a:off x="9064643" y="1907479"/>
+            <a:ext cx="337665" cy="369332"/>
+          </a:xfrm>
+          <a:prstGeom prst="rect">
+            <a:avLst/>
+          </a:prstGeom>
+          <a:noFill/>
+        </p:spPr>
+        <p:txBody>
+          <a:bodyPr wrap="square" rtlCol="0">
+            <a:spAutoFit/>
+          </a:bodyPr>
+          <a:lstStyle/>
+          <a:p>
+            <a:r>
+              <a:rPr lang="en-US" dirty="0"/>
+              <a:t>H</a:t>
+            </a:r>
+          </a:p>
+        </p:txBody>
+      </p:sp>
+      <p:sp>
+        <p:nvSpPr>
+          <p:cNvPr id="53" name="TextBox 52">
+            <a:extLst>
+              <a:ext uri="{FF2B5EF4-FFF2-40B4-BE49-F238E27FC236}">
+                <a16:creationId xmlns:a16="http://schemas.microsoft.com/office/drawing/2014/main" id="{51C84FA6-3099-4DA8-9577-8DE3BD6E92E9}"/>
+              </a:ext>
+            </a:extLst>
+          </p:cNvPr>
+          <p:cNvSpPr txBox="1"/>
+          <p:nvPr/>
+        </p:nvSpPr>
+        <p:spPr>
+          <a:xfrm>
+            <a:off x="9162248" y="2578912"/>
+            <a:ext cx="337665" cy="369332"/>
+          </a:xfrm>
+          <a:prstGeom prst="rect">
+            <a:avLst/>
+          </a:prstGeom>
+          <a:noFill/>
+        </p:spPr>
+        <p:txBody>
+          <a:bodyPr wrap="square" rtlCol="0">
+            <a:spAutoFit/>
+          </a:bodyPr>
+          <a:lstStyle/>
+          <a:p>
+            <a:r>
+              <a:rPr lang="en-US" dirty="0"/>
+              <a:t>I</a:t>
+            </a:r>
+          </a:p>
+        </p:txBody>
+      </p:sp>
+      <p:sp>
+        <p:nvSpPr>
+          <p:cNvPr id="54" name="TextBox 53">
+            <a:extLst>
+              <a:ext uri="{FF2B5EF4-FFF2-40B4-BE49-F238E27FC236}">
+                <a16:creationId xmlns:a16="http://schemas.microsoft.com/office/drawing/2014/main" id="{9D1CA798-EEE6-4BC0-B04E-618CF6A459BF}"/>
+              </a:ext>
+            </a:extLst>
+          </p:cNvPr>
+          <p:cNvSpPr txBox="1"/>
+          <p:nvPr/>
+        </p:nvSpPr>
+        <p:spPr>
+          <a:xfrm>
+            <a:off x="4746852" y="1277342"/>
+            <a:ext cx="337665" cy="369332"/>
+          </a:xfrm>
+          <a:prstGeom prst="rect">
+            <a:avLst/>
+          </a:prstGeom>
+          <a:noFill/>
+        </p:spPr>
+        <p:txBody>
+          <a:bodyPr wrap="square" rtlCol="0">
+            <a:spAutoFit/>
+          </a:bodyPr>
+          <a:lstStyle/>
+          <a:p>
+            <a:r>
+              <a:rPr lang="en-US" dirty="0"/>
+              <a:t>J</a:t>
+            </a:r>
+          </a:p>
+        </p:txBody>
+      </p:sp>
+      <p:sp>
+        <p:nvSpPr>
+          <p:cNvPr id="55" name="TextBox 54">
+            <a:extLst>
+              <a:ext uri="{FF2B5EF4-FFF2-40B4-BE49-F238E27FC236}">
+                <a16:creationId xmlns:a16="http://schemas.microsoft.com/office/drawing/2014/main" id="{0087BD1C-FC6F-401D-A9E0-7726B3AF45FE}"/>
+              </a:ext>
+            </a:extLst>
+          </p:cNvPr>
+          <p:cNvSpPr txBox="1"/>
+          <p:nvPr/>
+        </p:nvSpPr>
+        <p:spPr>
+          <a:xfrm>
+            <a:off x="5146753" y="1016972"/>
+            <a:ext cx="337665" cy="369332"/>
+          </a:xfrm>
+          <a:prstGeom prst="rect">
+            <a:avLst/>
+          </a:prstGeom>
+          <a:noFill/>
+        </p:spPr>
+        <p:txBody>
+          <a:bodyPr wrap="square" rtlCol="0">
+            <a:spAutoFit/>
+          </a:bodyPr>
+          <a:lstStyle/>
+          <a:p>
+            <a:r>
+              <a:rPr lang="en-US" dirty="0"/>
+              <a:t>K</a:t>
+            </a:r>
+          </a:p>
+        </p:txBody>
+      </p:sp>
+      <p:sp>
+        <p:nvSpPr>
+          <p:cNvPr id="56" name="TextBox 55">
+            <a:extLst>
+              <a:ext uri="{FF2B5EF4-FFF2-40B4-BE49-F238E27FC236}">
+                <a16:creationId xmlns:a16="http://schemas.microsoft.com/office/drawing/2014/main" id="{0618F5B3-1958-4FE0-B703-2FF48425E6DD}"/>
+              </a:ext>
+            </a:extLst>
+          </p:cNvPr>
+          <p:cNvSpPr txBox="1"/>
+          <p:nvPr/>
+        </p:nvSpPr>
+        <p:spPr>
+          <a:xfrm>
+            <a:off x="5927167" y="1228954"/>
+            <a:ext cx="337665" cy="369332"/>
+          </a:xfrm>
+          <a:prstGeom prst="rect">
+            <a:avLst/>
+          </a:prstGeom>
+          <a:noFill/>
+        </p:spPr>
+        <p:txBody>
+          <a:bodyPr wrap="square" rtlCol="0">
+            <a:spAutoFit/>
+          </a:bodyPr>
+          <a:lstStyle/>
+          <a:p>
+            <a:r>
+              <a:rPr lang="en-US" dirty="0"/>
+              <a:t>L</a:t>
+            </a:r>
+          </a:p>
+        </p:txBody>
+      </p:sp>
+      <p:sp>
+        <p:nvSpPr>
+          <p:cNvPr id="57" name="TextBox 56">
+            <a:extLst>
+              <a:ext uri="{FF2B5EF4-FFF2-40B4-BE49-F238E27FC236}">
+                <a16:creationId xmlns:a16="http://schemas.microsoft.com/office/drawing/2014/main" id="{211102D7-0B3A-4E2F-BFB4-EAF39347EC5A}"/>
+              </a:ext>
+            </a:extLst>
+          </p:cNvPr>
+          <p:cNvSpPr txBox="1"/>
+          <p:nvPr/>
+        </p:nvSpPr>
+        <p:spPr>
+          <a:xfrm>
+            <a:off x="9059415" y="1118469"/>
+            <a:ext cx="337665" cy="369332"/>
+          </a:xfrm>
+          <a:prstGeom prst="rect">
+            <a:avLst/>
+          </a:prstGeom>
+          <a:noFill/>
+        </p:spPr>
+        <p:txBody>
+          <a:bodyPr wrap="square" rtlCol="0">
+            <a:spAutoFit/>
+          </a:bodyPr>
+          <a:lstStyle/>
+          <a:p>
+            <a:r>
+              <a:rPr lang="en-US" dirty="0"/>
+              <a:t>M</a:t>
+            </a:r>
+          </a:p>
+        </p:txBody>
+      </p:sp>
     </p:spTree>
     <p:extLst>
       <p:ext uri="{BB962C8B-B14F-4D97-AF65-F5344CB8AC3E}">

</xml_diff>